<commit_message>
Add Documentation and actual DB content
</commit_message>
<xml_diff>
--- a/Docs/Weichbrötchen Webshop.pptx
+++ b/Docs/Weichbrötchen Webshop.pptx
@@ -9,7 +9,8 @@
     <p:sldId id="257" r:id="rId3"/>
     <p:sldId id="258" r:id="rId4"/>
     <p:sldId id="259" r:id="rId5"/>
-    <p:sldId id="260" r:id="rId6"/>
+    <p:sldId id="261" r:id="rId6"/>
+    <p:sldId id="260" r:id="rId7"/>
   </p:sldIdLst>
   <p:sldSz cx="9144000" cy="6858000" type="screen4x3"/>
   <p:notesSz cx="6858000" cy="9144000"/>
@@ -3227,15 +3228,33 @@
           <a:p>
             <a:r>
               <a:rPr lang="de-CH" dirty="0" smtClean="0"/>
+              <a:t>HTML</a:t>
+            </a:r>
+          </a:p>
+          <a:p>
+            <a:r>
+              <a:rPr lang="de-CH" dirty="0" smtClean="0"/>
+              <a:t>CSS</a:t>
+            </a:r>
+          </a:p>
+          <a:p>
+            <a:r>
+              <a:rPr lang="de-CH" dirty="0" smtClean="0"/>
               <a:t>PHP 5.4</a:t>
             </a:r>
           </a:p>
           <a:p>
             <a:r>
               <a:rPr lang="de-CH" dirty="0" err="1" smtClean="0"/>
-              <a:t>javascript</a:t>
+              <a:t>Javascript</a:t>
             </a:r>
             <a:endParaRPr lang="de-CH" dirty="0" smtClean="0"/>
+          </a:p>
+          <a:p>
+            <a:r>
+              <a:rPr lang="de-CH" dirty="0" smtClean="0"/>
+              <a:t>AJAX</a:t>
+            </a:r>
           </a:p>
           <a:p>
             <a:r>
@@ -3341,7 +3360,7 @@
           <a:p>
             <a:r>
               <a:rPr lang="de-CH" dirty="0" smtClean="0"/>
-              <a:t>Nicht implementiert sind HTML Templates, dafür werden aber mehrfach verwendete Codezeilen in Schlaufen generiert.</a:t>
+              <a:t>Nicht implementiert sind HTML Templates, dafür werden aber mehrfach verwendete Codezeilen in Schlaufen generiert und wenn möglich/sinnvoll die Display-Funktionen der Klassen genutzt.</a:t>
             </a:r>
           </a:p>
         </p:txBody>
@@ -3431,7 +3450,9 @@
         </p:nvSpPr>
         <p:spPr/>
         <p:txBody>
-          <a:bodyPr/>
+          <a:bodyPr>
+            <a:normAutofit/>
+          </a:bodyPr>
           <a:lstStyle/>
           <a:p>
             <a:r>
@@ -3443,38 +3464,47 @@
             <a:pPr lvl="1"/>
             <a:r>
               <a:rPr lang="de-CH" dirty="0" smtClean="0"/>
+              <a:t>Warenkorb</a:t>
+            </a:r>
+          </a:p>
+          <a:p>
+            <a:pPr lvl="2"/>
+            <a:r>
+              <a:rPr lang="de-CH" dirty="0" smtClean="0"/>
+              <a:t>Erstellen der HTML anzeige und generieren des </a:t>
+            </a:r>
+            <a:r>
+              <a:rPr lang="de-CH" dirty="0" err="1" smtClean="0"/>
+              <a:t>PDF’s</a:t>
+            </a:r>
+            <a:endParaRPr lang="de-CH" dirty="0" smtClean="0"/>
+          </a:p>
+          <a:p>
+            <a:pPr lvl="1"/>
+            <a:r>
+              <a:rPr lang="de-CH" dirty="0" smtClean="0"/>
               <a:t>Produkte anzeigen</a:t>
             </a:r>
           </a:p>
           <a:p>
+            <a:pPr lvl="2"/>
+            <a:r>
+              <a:rPr lang="de-CH" dirty="0" smtClean="0"/>
+              <a:t>Auslesen aus der Datenbank und in HTML anzeigen</a:t>
+            </a:r>
+          </a:p>
+          <a:p>
             <a:pPr lvl="1"/>
             <a:r>
               <a:rPr lang="de-CH" dirty="0" smtClean="0"/>
-              <a:t>Warenkorb</a:t>
-            </a:r>
-          </a:p>
-          <a:p>
-            <a:pPr lvl="1"/>
-            <a:endParaRPr lang="de-CH" dirty="0" smtClean="0"/>
-          </a:p>
-          <a:p>
-            <a:r>
-              <a:rPr lang="de-CH" dirty="0" smtClean="0"/>
-              <a:t>Vonop1:</a:t>
-            </a:r>
-          </a:p>
-          <a:p>
-            <a:pPr lvl="1"/>
-            <a:r>
-              <a:rPr lang="de-CH" dirty="0" smtClean="0"/>
-              <a:t>Grunddesign</a:t>
-            </a:r>
-          </a:p>
-          <a:p>
-            <a:pPr lvl="1"/>
-            <a:r>
-              <a:rPr lang="de-CH" dirty="0" smtClean="0"/>
-              <a:t>Benutzerverwaltung</a:t>
+              <a:t>Produktdatenbank</a:t>
+            </a:r>
+          </a:p>
+          <a:p>
+            <a:pPr lvl="2"/>
+            <a:r>
+              <a:rPr lang="de-CH" dirty="0" smtClean="0"/>
+              <a:t>Erstellen der Datenbank Struktur und einfüllen der Produkte</a:t>
             </a:r>
           </a:p>
         </p:txBody>
@@ -3526,6 +3556,180 @@
           <a:p>
             <a:r>
               <a:rPr lang="de-CH" dirty="0" err="1" smtClean="0"/>
+              <a:t>distribution</a:t>
+            </a:r>
+            <a:r>
+              <a:rPr lang="de-CH" dirty="0" smtClean="0"/>
+              <a:t> </a:t>
+            </a:r>
+            <a:r>
+              <a:rPr lang="de-CH" dirty="0" err="1" smtClean="0"/>
+              <a:t>of</a:t>
+            </a:r>
+            <a:r>
+              <a:rPr lang="de-CH" dirty="0" smtClean="0"/>
+              <a:t> </a:t>
+            </a:r>
+            <a:r>
+              <a:rPr lang="de-CH" dirty="0" err="1" smtClean="0"/>
+              <a:t>work</a:t>
+            </a:r>
+            <a:r>
+              <a:rPr lang="de-CH" dirty="0" smtClean="0"/>
+              <a:t> </a:t>
+            </a:r>
+            <a:endParaRPr lang="de-CH" dirty="0"/>
+          </a:p>
+        </p:txBody>
+      </p:sp>
+      <p:sp>
+        <p:nvSpPr>
+          <p:cNvPr id="3" name="Inhaltsplatzhalter 2"/>
+          <p:cNvSpPr>
+            <a:spLocks noGrp="1"/>
+          </p:cNvSpPr>
+          <p:nvPr>
+            <p:ph idx="1"/>
+          </p:nvPr>
+        </p:nvSpPr>
+        <p:spPr/>
+        <p:txBody>
+          <a:bodyPr>
+            <a:normAutofit fontScale="92500" lnSpcReduction="20000"/>
+          </a:bodyPr>
+          <a:lstStyle/>
+          <a:p>
+            <a:r>
+              <a:rPr lang="de-CH" dirty="0" smtClean="0"/>
+              <a:t>Vonop1:</a:t>
+            </a:r>
+          </a:p>
+          <a:p>
+            <a:pPr lvl="1"/>
+            <a:r>
+              <a:rPr lang="de-CH" dirty="0" smtClean="0"/>
+              <a:t>Grunddesign (HTML und CSS)</a:t>
+            </a:r>
+          </a:p>
+          <a:p>
+            <a:pPr lvl="1"/>
+            <a:r>
+              <a:rPr lang="de-CH" dirty="0" smtClean="0"/>
+              <a:t>Webservice</a:t>
+            </a:r>
+          </a:p>
+          <a:p>
+            <a:pPr lvl="2"/>
+            <a:r>
+              <a:rPr lang="de-CH" dirty="0" smtClean="0"/>
+              <a:t>Verwendung von webservicex.net</a:t>
+            </a:r>
+          </a:p>
+          <a:p>
+            <a:pPr lvl="2"/>
+            <a:r>
+              <a:rPr lang="de-CH" dirty="0" smtClean="0"/>
+              <a:t>Verwendung von </a:t>
+            </a:r>
+            <a:r>
+              <a:rPr lang="de-CH" dirty="0" err="1" smtClean="0"/>
+              <a:t>nusoap</a:t>
+            </a:r>
+            <a:r>
+              <a:rPr lang="de-CH" dirty="0" smtClean="0"/>
+              <a:t>, damit es überall funktioniert (http://nusoap.sourceforge.net)</a:t>
+            </a:r>
+          </a:p>
+          <a:p>
+            <a:pPr lvl="1"/>
+            <a:r>
+              <a:rPr lang="de-CH" dirty="0" smtClean="0"/>
+              <a:t>Benutzerverwaltung</a:t>
+            </a:r>
+          </a:p>
+          <a:p>
+            <a:pPr lvl="2"/>
+            <a:r>
+              <a:rPr lang="de-CH" dirty="0" smtClean="0"/>
+              <a:t>User-Class und User-DB-Class (OOPHP, MySQL)</a:t>
+            </a:r>
+          </a:p>
+          <a:p>
+            <a:pPr lvl="2"/>
+            <a:r>
+              <a:rPr lang="de-CH" dirty="0" smtClean="0"/>
+              <a:t>Formular-Validierung (Java-Script, AJAX)</a:t>
+            </a:r>
+          </a:p>
+          <a:p>
+            <a:pPr lvl="2"/>
+            <a:r>
+              <a:rPr lang="de-CH" dirty="0" smtClean="0"/>
+              <a:t>Einbindung </a:t>
+            </a:r>
+            <a:r>
+              <a:rPr lang="de-CH" dirty="0" err="1" smtClean="0"/>
+              <a:t>password.php</a:t>
+            </a:r>
+            <a:r>
+              <a:rPr lang="de-CH" dirty="0" smtClean="0"/>
+              <a:t> für Hash-/Salt-Funktionen in älteren PHP-Versionen (https://github.com/ircmaxell/password_compat)</a:t>
+            </a:r>
+            <a:endParaRPr lang="de-CH" dirty="0"/>
+          </a:p>
+          <a:p>
+            <a:pPr lvl="2"/>
+            <a:endParaRPr lang="de-CH" dirty="0" smtClean="0"/>
+          </a:p>
+        </p:txBody>
+      </p:sp>
+    </p:spTree>
+    <p:extLst>
+      <p:ext uri="{BB962C8B-B14F-4D97-AF65-F5344CB8AC3E}">
+        <p14:creationId xmlns:p14="http://schemas.microsoft.com/office/powerpoint/2010/main" val="3025035540"/>
+      </p:ext>
+    </p:extLst>
+  </p:cSld>
+  <p:clrMapOvr>
+    <a:masterClrMapping/>
+  </p:clrMapOvr>
+</p:sld>
+</file>
+
+<file path=ppt/slides/slide6.xml><?xml version="1.0" encoding="utf-8"?>
+<p:sld xmlns:a="http://schemas.openxmlformats.org/drawingml/2006/main" xmlns:r="http://schemas.openxmlformats.org/officeDocument/2006/relationships" xmlns:p="http://schemas.openxmlformats.org/presentationml/2006/main">
+  <p:cSld>
+    <p:spTree>
+      <p:nvGrpSpPr>
+        <p:cNvPr id="1" name=""/>
+        <p:cNvGrpSpPr/>
+        <p:nvPr/>
+      </p:nvGrpSpPr>
+      <p:grpSpPr>
+        <a:xfrm>
+          <a:off x="0" y="0"/>
+          <a:ext cx="0" cy="0"/>
+          <a:chOff x="0" y="0"/>
+          <a:chExt cx="0" cy="0"/>
+        </a:xfrm>
+      </p:grpSpPr>
+      <p:sp>
+        <p:nvSpPr>
+          <p:cNvPr id="2" name="Titel 1"/>
+          <p:cNvSpPr>
+            <a:spLocks noGrp="1"/>
+          </p:cNvSpPr>
+          <p:nvPr>
+            <p:ph type="title"/>
+          </p:nvPr>
+        </p:nvSpPr>
+        <p:spPr/>
+        <p:txBody>
+          <a:bodyPr/>
+          <a:lstStyle/>
+          <a:p>
+            <a:r>
+              <a:rPr lang="de-CH" dirty="0" err="1" smtClean="0"/>
               <a:t>lessons</a:t>
             </a:r>
             <a:r>
@@ -3561,13 +3765,36 @@
           <a:p>
             <a:r>
               <a:rPr lang="de-CH" dirty="0" smtClean="0"/>
-              <a:t>Erstes </a:t>
-            </a:r>
-            <a:r>
-              <a:rPr lang="de-CH" smtClean="0"/>
-              <a:t>PHP Projekt</a:t>
-            </a:r>
-            <a:endParaRPr lang="de-CH" dirty="0" smtClean="0"/>
+              <a:t>Erstes PHP Projekt</a:t>
+            </a:r>
+          </a:p>
+          <a:p>
+            <a:pPr lvl="1"/>
+            <a:r>
+              <a:rPr lang="de-CH" dirty="0" smtClean="0"/>
+              <a:t>Viel neues und relativ viel Einarbeitungszeit</a:t>
+            </a:r>
+          </a:p>
+          <a:p>
+            <a:r>
+              <a:rPr lang="de-CH" dirty="0" smtClean="0"/>
+              <a:t>Zusammenarbeit teilweise etwas schwierig</a:t>
+            </a:r>
+          </a:p>
+          <a:p>
+            <a:pPr lvl="1"/>
+            <a:r>
+              <a:rPr lang="de-CH" dirty="0" smtClean="0"/>
+              <a:t>das jeder am Projekt arbeiten kann, aber die benötigten Daten hat (Grunddesign, Datenbank…)</a:t>
+            </a:r>
+          </a:p>
+          <a:p>
+            <a:pPr lvl="1"/>
+            <a:r>
+              <a:rPr lang="de-CH" dirty="0" smtClean="0"/>
+              <a:t>Ansonsten aber problemlos durch Aufteilung</a:t>
+            </a:r>
+            <a:endParaRPr lang="de-CH" dirty="0"/>
           </a:p>
         </p:txBody>
       </p:sp>

</xml_diff>